<commit_message>
Adapted OpenMaze for timing testing experiment
</commit_message>
<xml_diff>
--- a/Assets/StreamingAssets/2D_Objects/Tutorial_Instructions/~Tutorial Instructions.pptx
+++ b/Assets/StreamingAssets/2D_Objects/Tutorial_Instructions/~Tutorial Instructions.pptx
@@ -17,6 +17,8 @@
     <p:sldId id="281" r:id="rId11"/>
     <p:sldId id="262" r:id="rId12"/>
     <p:sldId id="283" r:id="rId13"/>
+    <p:sldId id="284" r:id="rId14"/>
+    <p:sldId id="285" r:id="rId15"/>
   </p:sldIdLst>
   <p:sldSz cx="12192000" cy="6858000"/>
   <p:notesSz cx="6858000" cy="9144000"/>
@@ -270,7 +272,7 @@
           <a:p>
             <a:fld id="{43D9F887-C526-42E2-BE1C-7F1C55940A26}" type="datetimeFigureOut">
               <a:rPr lang="en-US" smtClean="0"/>
-              <a:t>2/3/2020</a:t>
+              <a:t>5/7/2020</a:t>
             </a:fld>
             <a:endParaRPr lang="en-US"/>
           </a:p>
@@ -468,7 +470,7 @@
           <a:p>
             <a:fld id="{43D9F887-C526-42E2-BE1C-7F1C55940A26}" type="datetimeFigureOut">
               <a:rPr lang="en-US" smtClean="0"/>
-              <a:t>2/3/2020</a:t>
+              <a:t>5/7/2020</a:t>
             </a:fld>
             <a:endParaRPr lang="en-US"/>
           </a:p>
@@ -676,7 +678,7 @@
           <a:p>
             <a:fld id="{43D9F887-C526-42E2-BE1C-7F1C55940A26}" type="datetimeFigureOut">
               <a:rPr lang="en-US" smtClean="0"/>
-              <a:t>2/3/2020</a:t>
+              <a:t>5/7/2020</a:t>
             </a:fld>
             <a:endParaRPr lang="en-US"/>
           </a:p>
@@ -874,7 +876,7 @@
           <a:p>
             <a:fld id="{43D9F887-C526-42E2-BE1C-7F1C55940A26}" type="datetimeFigureOut">
               <a:rPr lang="en-US" smtClean="0"/>
-              <a:t>2/3/2020</a:t>
+              <a:t>5/7/2020</a:t>
             </a:fld>
             <a:endParaRPr lang="en-US"/>
           </a:p>
@@ -1149,7 +1151,7 @@
           <a:p>
             <a:fld id="{43D9F887-C526-42E2-BE1C-7F1C55940A26}" type="datetimeFigureOut">
               <a:rPr lang="en-US" smtClean="0"/>
-              <a:t>2/3/2020</a:t>
+              <a:t>5/7/2020</a:t>
             </a:fld>
             <a:endParaRPr lang="en-US"/>
           </a:p>
@@ -1414,7 +1416,7 @@
           <a:p>
             <a:fld id="{43D9F887-C526-42E2-BE1C-7F1C55940A26}" type="datetimeFigureOut">
               <a:rPr lang="en-US" smtClean="0"/>
-              <a:t>2/3/2020</a:t>
+              <a:t>5/7/2020</a:t>
             </a:fld>
             <a:endParaRPr lang="en-US"/>
           </a:p>
@@ -1826,7 +1828,7 @@
           <a:p>
             <a:fld id="{43D9F887-C526-42E2-BE1C-7F1C55940A26}" type="datetimeFigureOut">
               <a:rPr lang="en-US" smtClean="0"/>
-              <a:t>2/3/2020</a:t>
+              <a:t>5/7/2020</a:t>
             </a:fld>
             <a:endParaRPr lang="en-US"/>
           </a:p>
@@ -1967,7 +1969,7 @@
           <a:p>
             <a:fld id="{43D9F887-C526-42E2-BE1C-7F1C55940A26}" type="datetimeFigureOut">
               <a:rPr lang="en-US" smtClean="0"/>
-              <a:t>2/3/2020</a:t>
+              <a:t>5/7/2020</a:t>
             </a:fld>
             <a:endParaRPr lang="en-US"/>
           </a:p>
@@ -2080,7 +2082,7 @@
           <a:p>
             <a:fld id="{43D9F887-C526-42E2-BE1C-7F1C55940A26}" type="datetimeFigureOut">
               <a:rPr lang="en-US" smtClean="0"/>
-              <a:t>2/3/2020</a:t>
+              <a:t>5/7/2020</a:t>
             </a:fld>
             <a:endParaRPr lang="en-US"/>
           </a:p>
@@ -2391,7 +2393,7 @@
           <a:p>
             <a:fld id="{43D9F887-C526-42E2-BE1C-7F1C55940A26}" type="datetimeFigureOut">
               <a:rPr lang="en-US" smtClean="0"/>
-              <a:t>2/3/2020</a:t>
+              <a:t>5/7/2020</a:t>
             </a:fld>
             <a:endParaRPr lang="en-US"/>
           </a:p>
@@ -2679,7 +2681,7 @@
           <a:p>
             <a:fld id="{43D9F887-C526-42E2-BE1C-7F1C55940A26}" type="datetimeFigureOut">
               <a:rPr lang="en-US" smtClean="0"/>
-              <a:t>2/3/2020</a:t>
+              <a:t>5/7/2020</a:t>
             </a:fld>
             <a:endParaRPr lang="en-US"/>
           </a:p>
@@ -2920,7 +2922,7 @@
           <a:p>
             <a:fld id="{43D9F887-C526-42E2-BE1C-7F1C55940A26}" type="datetimeFigureOut">
               <a:rPr lang="en-US" smtClean="0"/>
-              <a:t>2/3/2020</a:t>
+              <a:t>5/7/2020</a:t>
             </a:fld>
             <a:endParaRPr lang="en-US"/>
           </a:p>
@@ -3660,6 +3662,112 @@
     <p:extLst>
       <p:ext uri="{BB962C8B-B14F-4D97-AF65-F5344CB8AC3E}">
         <p14:creationId xmlns:p14="http://schemas.microsoft.com/office/powerpoint/2010/main" val="2719937560"/>
+      </p:ext>
+    </p:extLst>
+  </p:cSld>
+  <p:clrMapOvr>
+    <a:masterClrMapping/>
+  </p:clrMapOvr>
+</p:sld>
+</file>
+
+<file path=ppt/slides/slide13.xml><?xml version="1.0" encoding="utf-8"?>
+<p:sld xmlns:a="http://schemas.openxmlformats.org/drawingml/2006/main" xmlns:r="http://schemas.openxmlformats.org/officeDocument/2006/relationships" xmlns:p="http://schemas.openxmlformats.org/presentationml/2006/main">
+  <p:cSld>
+    <p:spTree>
+      <p:nvGrpSpPr>
+        <p:cNvPr id="1" name=""/>
+        <p:cNvGrpSpPr/>
+        <p:nvPr/>
+      </p:nvGrpSpPr>
+      <p:grpSpPr>
+        <a:xfrm>
+          <a:off x="0" y="0"/>
+          <a:ext cx="0" cy="0"/>
+          <a:chOff x="0" y="0"/>
+          <a:chExt cx="0" cy="0"/>
+        </a:xfrm>
+      </p:grpSpPr>
+      <p:sp>
+        <p:nvSpPr>
+          <p:cNvPr id="4" name="Rectangle 3">
+            <a:extLst>
+              <a:ext uri="{FF2B5EF4-FFF2-40B4-BE49-F238E27FC236}">
+                <a16:creationId xmlns:a16="http://schemas.microsoft.com/office/drawing/2014/main" id="{FD305582-1450-438B-845C-5A9E45EE10B8}"/>
+              </a:ext>
+            </a:extLst>
+          </p:cNvPr>
+          <p:cNvSpPr/>
+          <p:nvPr/>
+        </p:nvSpPr>
+        <p:spPr>
+          <a:xfrm>
+            <a:off x="0" y="0"/>
+            <a:ext cx="12236477" cy="6858000"/>
+          </a:xfrm>
+          <a:prstGeom prst="rect">
+            <a:avLst/>
+          </a:prstGeom>
+        </p:spPr>
+        <p:style>
+          <a:lnRef idx="2">
+            <a:schemeClr val="dk1">
+              <a:shade val="50000"/>
+            </a:schemeClr>
+          </a:lnRef>
+          <a:fillRef idx="1">
+            <a:schemeClr val="dk1"/>
+          </a:fillRef>
+          <a:effectRef idx="0">
+            <a:schemeClr val="dk1"/>
+          </a:effectRef>
+          <a:fontRef idx="minor">
+            <a:schemeClr val="lt1"/>
+          </a:fontRef>
+        </p:style>
+        <p:txBody>
+          <a:bodyPr rtlCol="0" anchor="ctr"/>
+          <a:lstStyle/>
+          <a:p>
+            <a:pPr algn="ctr"/>
+            <a:endParaRPr lang="en-US"/>
+          </a:p>
+        </p:txBody>
+      </p:sp>
+    </p:spTree>
+    <p:extLst>
+      <p:ext uri="{BB962C8B-B14F-4D97-AF65-F5344CB8AC3E}">
+        <p14:creationId xmlns:p14="http://schemas.microsoft.com/office/powerpoint/2010/main" val="3256560597"/>
+      </p:ext>
+    </p:extLst>
+  </p:cSld>
+  <p:clrMapOvr>
+    <a:masterClrMapping/>
+  </p:clrMapOvr>
+</p:sld>
+</file>
+
+<file path=ppt/slides/slide14.xml><?xml version="1.0" encoding="utf-8"?>
+<p:sld xmlns:a="http://schemas.openxmlformats.org/drawingml/2006/main" xmlns:r="http://schemas.openxmlformats.org/officeDocument/2006/relationships" xmlns:p="http://schemas.openxmlformats.org/presentationml/2006/main">
+  <p:cSld>
+    <p:spTree>
+      <p:nvGrpSpPr>
+        <p:cNvPr id="1" name=""/>
+        <p:cNvGrpSpPr/>
+        <p:nvPr/>
+      </p:nvGrpSpPr>
+      <p:grpSpPr>
+        <a:xfrm>
+          <a:off x="0" y="0"/>
+          <a:ext cx="0" cy="0"/>
+          <a:chOff x="0" y="0"/>
+          <a:chExt cx="0" cy="0"/>
+        </a:xfrm>
+      </p:grpSpPr>
+    </p:spTree>
+    <p:extLst>
+      <p:ext uri="{BB962C8B-B14F-4D97-AF65-F5344CB8AC3E}">
+        <p14:creationId xmlns:p14="http://schemas.microsoft.com/office/powerpoint/2010/main" val="1530270551"/>
       </p:ext>
     </p:extLst>
   </p:cSld>

</xml_diff>